<commit_message>
Correcciones menores en power point
</commit_message>
<xml_diff>
--- a/Defensa/Cosas para usar/Defensa.pptx
+++ b/Defensa/Cosas para usar/Defensa.pptx
@@ -8389,8 +8389,13 @@
             </a:r>
             <a:r>
               <a:rPr lang="es-ES" sz="1400" dirty="0" smtClean="0"/>
-              <a:t>- Cuando hay pixeles cercanos en altura se generan batidos</a:t>
-            </a:r>
+              <a:t>- Cuando hay pixeles cercanos en altura se generan </a:t>
+            </a:r>
+            <a:r>
+              <a:rPr lang="es-ES" sz="1400" dirty="0" smtClean="0"/>
+              <a:t>batidos.</a:t>
+            </a:r>
+            <a:endParaRPr lang="es-ES" sz="1400" dirty="0" smtClean="0"/>
           </a:p>
           <a:p>
             <a:r>
@@ -8399,8 +8404,13 @@
             </a:r>
             <a:r>
               <a:rPr lang="es-ES" sz="1400" dirty="0" smtClean="0"/>
-              <a:t>	- Cuando los pixeles empiezan y terminan se generan armónicos</a:t>
-            </a:r>
+              <a:t>	- Cuando los pixeles empiezan y terminan se generan </a:t>
+            </a:r>
+            <a:r>
+              <a:rPr lang="es-ES" sz="1400" dirty="0" smtClean="0"/>
+              <a:t>armónicos.</a:t>
+            </a:r>
+            <a:endParaRPr lang="es-ES" sz="1400" dirty="0" smtClean="0"/>
           </a:p>
           <a:p>
             <a:endParaRPr lang="es-ES" dirty="0" smtClean="0"/>
@@ -8424,7 +8434,11 @@
             </a:r>
             <a:r>
               <a:rPr lang="es-ES" sz="1400" dirty="0" smtClean="0"/>
-              <a:t> la información. Y a mayor resolución se incrementan.</a:t>
+              <a:t> la información. Y </a:t>
+            </a:r>
+            <a:r>
+              <a:rPr lang="es-ES" sz="1400" dirty="0" smtClean="0"/>
+              <a:t>aumentan con la resolución.</a:t>
             </a:r>
             <a:endParaRPr lang="es-ES" sz="1400" dirty="0"/>
           </a:p>
@@ -9297,7 +9311,15 @@
             <a:pPr algn="ctr"/>
             <a:r>
               <a:rPr lang="es-ES" sz="2000" dirty="0" smtClean="0"/>
-              <a:t>Para hacer los experimentos tuvimos que desarrollar un software especifico.</a:t>
+              <a:t>Para hacer los experimentos tuvimos que desarrollar un software </a:t>
+            </a:r>
+            <a:r>
+              <a:rPr lang="es-ES" sz="2000" dirty="0" smtClean="0"/>
+              <a:t>específico</a:t>
+            </a:r>
+            <a:r>
+              <a:rPr lang="es-ES" sz="2000" dirty="0" smtClean="0"/>
+              <a:t>.</a:t>
             </a:r>
           </a:p>
           <a:p>
@@ -12107,7 +12129,11 @@
           <a:p>
             <a:r>
               <a:rPr lang="es-ES" sz="1400" dirty="0" smtClean="0"/>
-              <a:t>Estimulo neutro</a:t>
+              <a:t>Estímulo </a:t>
+            </a:r>
+            <a:r>
+              <a:rPr lang="es-ES" sz="1400" dirty="0" smtClean="0"/>
+              <a:t>neutro</a:t>
             </a:r>
             <a:endParaRPr lang="es-ES" sz="1400" dirty="0"/>
           </a:p>
@@ -12332,8 +12358,21 @@
             </a:pPr>
             <a:r>
               <a:rPr lang="es-ES" sz="2000" dirty="0" smtClean="0"/>
-              <a:t>Se agrego la medición de la categoría ángulos</a:t>
-            </a:r>
+              <a:t>Se </a:t>
+            </a:r>
+            <a:r>
+              <a:rPr lang="es-ES" sz="2000" dirty="0" smtClean="0"/>
+              <a:t>agregó </a:t>
+            </a:r>
+            <a:r>
+              <a:rPr lang="es-ES" sz="2000" dirty="0" smtClean="0"/>
+              <a:t>la medición de la categoría </a:t>
+            </a:r>
+            <a:r>
+              <a:rPr lang="es-ES" sz="2000" dirty="0" smtClean="0"/>
+              <a:t>ángulos.</a:t>
+            </a:r>
+            <a:endParaRPr lang="es-ES" sz="2000" dirty="0" smtClean="0"/>
           </a:p>
           <a:p>
             <a:pPr marL="285750" indent="-285750">
@@ -12342,8 +12381,21 @@
             </a:pPr>
             <a:r>
               <a:rPr lang="es-ES" sz="2000" dirty="0" smtClean="0"/>
-              <a:t>Se selecciono unas pocas orientaciones</a:t>
-            </a:r>
+              <a:t>Se </a:t>
+            </a:r>
+            <a:r>
+              <a:rPr lang="es-ES" sz="2000" dirty="0" smtClean="0"/>
+              <a:t>seleccionó </a:t>
+            </a:r>
+            <a:r>
+              <a:rPr lang="es-ES" sz="2000" dirty="0" smtClean="0"/>
+              <a:t>unas pocas </a:t>
+            </a:r>
+            <a:r>
+              <a:rPr lang="es-ES" sz="2000" dirty="0" smtClean="0"/>
+              <a:t>orientaciones.</a:t>
+            </a:r>
+            <a:endParaRPr lang="es-ES" sz="2000" dirty="0" smtClean="0"/>
           </a:p>
           <a:p>
             <a:pPr marL="285750" indent="-285750">
@@ -12352,8 +12404,13 @@
             </a:pPr>
             <a:r>
               <a:rPr lang="es-ES" sz="2000" dirty="0" smtClean="0"/>
-              <a:t>Se hizo el experimento con 12 sujetos en condición de laboratorio</a:t>
-            </a:r>
+              <a:t>Se hizo el experimento con 12 sujetos en condición de </a:t>
+            </a:r>
+            <a:r>
+              <a:rPr lang="es-ES" sz="2000" dirty="0" smtClean="0"/>
+              <a:t>laboratorio.</a:t>
+            </a:r>
+            <a:endParaRPr lang="es-ES" sz="2000" dirty="0" smtClean="0"/>
           </a:p>
         </p:txBody>
       </p:sp>
@@ -12775,7 +12832,11 @@
           <a:p>
             <a:r>
               <a:rPr lang="es-ES" sz="1400" dirty="0" smtClean="0"/>
-              <a:t>Estimulo neutro</a:t>
+              <a:t>Estímulo </a:t>
+            </a:r>
+            <a:r>
+              <a:rPr lang="es-ES" sz="1400" dirty="0" smtClean="0"/>
+              <a:t>neutro</a:t>
             </a:r>
             <a:endParaRPr lang="es-ES" sz="1400" dirty="0"/>
           </a:p>
@@ -13030,8 +13091,21 @@
             </a:pPr>
             <a:r>
               <a:rPr lang="es-ES" sz="2000" dirty="0" smtClean="0"/>
-              <a:t>Se agrego la medición de la categoría ángulos</a:t>
-            </a:r>
+              <a:t>Se </a:t>
+            </a:r>
+            <a:r>
+              <a:rPr lang="es-ES" sz="2000" dirty="0" smtClean="0"/>
+              <a:t>agregó </a:t>
+            </a:r>
+            <a:r>
+              <a:rPr lang="es-ES" sz="2000" dirty="0" smtClean="0"/>
+              <a:t>la medición de la categoría </a:t>
+            </a:r>
+            <a:r>
+              <a:rPr lang="es-ES" sz="2000" dirty="0" smtClean="0"/>
+              <a:t>ángulos.</a:t>
+            </a:r>
+            <a:endParaRPr lang="es-ES" sz="2000" dirty="0" smtClean="0"/>
           </a:p>
           <a:p>
             <a:pPr marL="285750" indent="-285750">
@@ -13040,8 +13114,21 @@
             </a:pPr>
             <a:r>
               <a:rPr lang="es-ES" sz="2000" dirty="0" smtClean="0"/>
-              <a:t>Se selecciono unas pocas orientaciones</a:t>
-            </a:r>
+              <a:t>Se </a:t>
+            </a:r>
+            <a:r>
+              <a:rPr lang="es-ES" sz="2000" dirty="0" smtClean="0"/>
+              <a:t>seleccionó </a:t>
+            </a:r>
+            <a:r>
+              <a:rPr lang="es-ES" sz="2000" dirty="0" smtClean="0"/>
+              <a:t>unas pocas </a:t>
+            </a:r>
+            <a:r>
+              <a:rPr lang="es-ES" sz="2000" dirty="0" smtClean="0"/>
+              <a:t>orientaciones.</a:t>
+            </a:r>
+            <a:endParaRPr lang="es-ES" sz="2000" dirty="0" smtClean="0"/>
           </a:p>
           <a:p>
             <a:pPr marL="285750" indent="-285750">
@@ -13050,8 +13137,13 @@
             </a:pPr>
             <a:r>
               <a:rPr lang="es-ES" sz="2000" dirty="0" smtClean="0"/>
-              <a:t>Se hizo el experimento con 12 sujetos en condición de laboratorio</a:t>
-            </a:r>
+              <a:t>Se hizo el experimento con 12 sujetos en condición de </a:t>
+            </a:r>
+            <a:r>
+              <a:rPr lang="es-ES" sz="2000" dirty="0" smtClean="0"/>
+              <a:t>laboratorio.</a:t>
+            </a:r>
+            <a:endParaRPr lang="es-ES" sz="2000" dirty="0" smtClean="0"/>
           </a:p>
         </p:txBody>
       </p:sp>
@@ -13183,15 +13275,7 @@
             <a:pPr algn="ctr"/>
             <a:r>
               <a:rPr lang="es-ES" sz="3600" dirty="0" smtClean="0"/>
-              <a:t>De </a:t>
-            </a:r>
-            <a:r>
-              <a:rPr lang="es-ES" sz="3600" dirty="0" smtClean="0"/>
-              <a:t>qué </a:t>
-            </a:r>
-            <a:r>
-              <a:rPr lang="es-ES" sz="3600" dirty="0" smtClean="0"/>
-              <a:t>vamos a hablar…</a:t>
+              <a:t>De qué vamos a hablar…</a:t>
             </a:r>
             <a:endParaRPr lang="es-ES" sz="3600" dirty="0"/>
           </a:p>
@@ -14198,8 +14282,8 @@
         </p:nvSpPr>
         <p:spPr>
           <a:xfrm>
-            <a:off x="2144621" y="1052736"/>
-            <a:ext cx="4814780" cy="369332"/>
+            <a:off x="2174373" y="1052736"/>
+            <a:ext cx="4755276" cy="369332"/>
           </a:xfrm>
           <a:prstGeom prst="rect">
             <a:avLst/>
@@ -14215,7 +14299,11 @@
             <a:pPr algn="ctr"/>
             <a:r>
               <a:rPr lang="es-ES" dirty="0" smtClean="0"/>
-              <a:t>Queremos observar el efecto del entrenamiento</a:t>
+              <a:t>Queríamos </a:t>
+            </a:r>
+            <a:r>
+              <a:rPr lang="es-ES" dirty="0" smtClean="0"/>
+              <a:t>observar el efecto del entrenamiento</a:t>
             </a:r>
             <a:endParaRPr lang="es-ES" dirty="0"/>
           </a:p>
@@ -14592,8 +14680,12 @@
           <a:p>
             <a:pPr algn="ctr"/>
             <a:r>
+              <a:rPr lang="es-ES" dirty="0"/>
+              <a:t>Queríamos observar </a:t>
+            </a:r>
+            <a:r>
               <a:rPr lang="es-ES" dirty="0" smtClean="0"/>
-              <a:t>Queremos observar el efecto del entrenamiento</a:t>
+              <a:t>el efecto del entrenamiento</a:t>
             </a:r>
             <a:endParaRPr lang="es-ES" dirty="0"/>
           </a:p>
@@ -16062,8 +16154,12 @@
           <a:p>
             <a:pPr algn="ctr"/>
             <a:r>
+              <a:rPr lang="es-ES" dirty="0"/>
+              <a:t>Queríamos observar </a:t>
+            </a:r>
+            <a:r>
               <a:rPr lang="es-ES" dirty="0" smtClean="0"/>
-              <a:t>Queremos observar el efecto del entrenamiento</a:t>
+              <a:t>el efecto del entrenamiento</a:t>
             </a:r>
             <a:endParaRPr lang="es-ES" dirty="0"/>
           </a:p>
@@ -18888,8 +18984,12 @@
           <a:p>
             <a:pPr algn="ctr"/>
             <a:r>
+              <a:rPr lang="es-ES" dirty="0"/>
+              <a:t>Queríamos observar </a:t>
+            </a:r>
+            <a:r>
               <a:rPr lang="es-ES" dirty="0" smtClean="0"/>
-              <a:t>Queremos observar el efecto del entrenamiento</a:t>
+              <a:t>el efecto del entrenamiento</a:t>
             </a:r>
             <a:endParaRPr lang="es-ES" dirty="0"/>
           </a:p>
@@ -19894,8 +19994,8 @@
         </p:nvSpPr>
         <p:spPr>
           <a:xfrm>
-            <a:off x="0" y="4869160"/>
-            <a:ext cx="9124011" cy="1877437"/>
+            <a:off x="755576" y="5212938"/>
+            <a:ext cx="8296427" cy="1600438"/>
           </a:xfrm>
           <a:prstGeom prst="rect">
             <a:avLst/>
@@ -19910,17 +20010,11 @@
           <a:p>
             <a:r>
               <a:rPr lang="es-ES" dirty="0" smtClean="0"/>
-              <a:t>Resultados relevantes:</a:t>
-            </a:r>
-          </a:p>
-          <a:p>
-            <a:r>
-              <a:rPr lang="es-ES" dirty="0"/>
-              <a:t>	</a:t>
+              <a:t>a</a:t>
             </a:r>
             <a:r>
               <a:rPr lang="es-ES" dirty="0" smtClean="0"/>
-              <a:t>a)</a:t>
+              <a:t>)</a:t>
             </a:r>
             <a:r>
               <a:rPr lang="es-ES" sz="1600" dirty="0" smtClean="0"/>
@@ -19930,7 +20024,11 @@
           <a:p>
             <a:r>
               <a:rPr lang="es-ES" sz="1600" dirty="0" smtClean="0"/>
-              <a:t>	b) Quitar el </a:t>
+              <a:t>b</a:t>
+            </a:r>
+            <a:r>
+              <a:rPr lang="es-ES" sz="1600" dirty="0" smtClean="0"/>
+              <a:t>) Quitar el </a:t>
             </a:r>
             <a:r>
               <a:rPr lang="es-ES" sz="1600" dirty="0" err="1" smtClean="0"/>
@@ -19943,12 +20041,16 @@
           </a:p>
           <a:p>
             <a:r>
-              <a:rPr lang="es-ES" sz="1600" dirty="0"/>
-              <a:t>	</a:t>
-            </a:r>
-            <a:r>
               <a:rPr lang="es-ES" sz="1600" dirty="0" smtClean="0"/>
-              <a:t>c) Hay un salto cualitativo en la primer sesión que hace que los sujetos mejoren mucho más que con la posterior reiteración del entrenamiento. Este efecto esta mucho mas marcado en ángulos</a:t>
+              <a:t>c</a:t>
+            </a:r>
+            <a:r>
+              <a:rPr lang="es-ES" sz="1600" dirty="0" smtClean="0"/>
+              <a:t>) Hay un salto cualitativo en la primer sesión que hace que los sujetos mejoren mucho más que con la posterior reiteración del entrenamiento. Este efecto esta mucho mas marcado en </a:t>
+            </a:r>
+            <a:r>
+              <a:rPr lang="es-ES" sz="1600" dirty="0" smtClean="0"/>
+              <a:t>ángulos.</a:t>
             </a:r>
             <a:endParaRPr lang="es-ES" sz="1600" dirty="0"/>
           </a:p>
@@ -20089,6 +20191,38 @@
               <a:rPr lang="es-ES" dirty="0" smtClean="0"/>
               <a:t>c)</a:t>
             </a:r>
+            <a:endParaRPr lang="es-ES" dirty="0"/>
+          </a:p>
+        </p:txBody>
+      </p:sp>
+      <p:sp>
+        <p:nvSpPr>
+          <p:cNvPr id="7" name="6 CuadroTexto"/>
+          <p:cNvSpPr txBox="1"/>
+          <p:nvPr/>
+        </p:nvSpPr>
+        <p:spPr>
+          <a:xfrm>
+            <a:off x="50151" y="4870901"/>
+            <a:ext cx="2289601" cy="646331"/>
+          </a:xfrm>
+          <a:prstGeom prst="rect">
+            <a:avLst/>
+          </a:prstGeom>
+          <a:noFill/>
+        </p:spPr>
+        <p:txBody>
+          <a:bodyPr wrap="none" rtlCol="0">
+            <a:spAutoFit/>
+          </a:bodyPr>
+          <a:lstStyle/>
+          <a:p>
+            <a:r>
+              <a:rPr lang="es-ES" dirty="0"/>
+              <a:t>Resultados relevantes:</a:t>
+            </a:r>
+          </a:p>
+          <a:p>
             <a:endParaRPr lang="es-ES" dirty="0"/>
           </a:p>
         </p:txBody>
@@ -20736,8 +20870,13 @@
             </a:r>
             <a:r>
               <a:rPr lang="es-ES" dirty="0" smtClean="0"/>
-              <a:t>- Hay muy pocos sujetos como para hacer estadística comparando las medidas</a:t>
-            </a:r>
+              <a:t>- Hay muy pocos sujetos como para hacer estadística comparando las </a:t>
+            </a:r>
+            <a:r>
+              <a:rPr lang="es-ES" dirty="0" smtClean="0"/>
+              <a:t>medidas.</a:t>
+            </a:r>
+            <a:endParaRPr lang="es-ES" dirty="0" smtClean="0"/>
           </a:p>
           <a:p>
             <a:r>
@@ -21084,7 +21223,15 @@
             </a:r>
             <a:r>
               <a:rPr lang="es-ES" dirty="0" smtClean="0"/>
-              <a:t>), los sujetos pueden reconocer patrones con muchísimo menos entrenamiento que en el caso de los estímulos complejos. Probablemente se deba a que no tienen que distinguir figura de fondo y a habilidades de compresión geométrica abstractas e independientes de la representación utilizada.</a:t>
+              <a:t>), los sujetos pueden reconocer patrones con muchísimo menos entrenamiento que en el caso de los estímulos complejos. Probablemente se deba a que no tienen que distinguir figura de </a:t>
+            </a:r>
+            <a:r>
+              <a:rPr lang="es-ES" dirty="0" smtClean="0"/>
+              <a:t>fondo. Junto </a:t>
+            </a:r>
+            <a:r>
+              <a:rPr lang="es-ES" dirty="0" smtClean="0"/>
+              <a:t>a habilidades de compresión geométrica abstractas e independientes de la representación utilizada.</a:t>
             </a:r>
           </a:p>
           <a:p>
@@ -21515,16 +21662,16 @@
               <a:buChar char="-"/>
             </a:pPr>
             <a:r>
-              <a:rPr lang="es-ES" dirty="0" smtClean="0"/>
+              <a:rPr lang="es-ES" dirty="0"/>
               <a:t>Al simplificar el estímulo que se presenta (siempre usando la lógica de representación de la información del </a:t>
             </a:r>
             <a:r>
-              <a:rPr lang="es-ES" dirty="0" err="1" smtClean="0"/>
+              <a:rPr lang="es-ES" dirty="0" err="1"/>
               <a:t>vOICe</a:t>
             </a:r>
             <a:r>
-              <a:rPr lang="es-ES" dirty="0" smtClean="0"/>
-              <a:t>), los sujetos pueden reconocer patrones con muchísimo menos entrenamiento que en el caso de los estímulos complejos. Probablemente se deba a que no tienen que distinguir figura de fondo y a habilidades de compresión geométrica abstractas e independientes de la representación utilizada.</a:t>
+              <a:rPr lang="es-ES" dirty="0"/>
+              <a:t>), los sujetos pueden reconocer patrones con muchísimo menos entrenamiento que en el caso de los estímulos complejos. Probablemente se deba a que no tienen que distinguir figura de fondo. Junto a habilidades de compresión geométrica abstractas e independientes de la representación utilizada.</a:t>
             </a:r>
           </a:p>
           <a:p>
@@ -21534,7 +21681,11 @@
             </a:pPr>
             <a:r>
               <a:rPr lang="es-ES" dirty="0" smtClean="0"/>
-              <a:t>El sistema de representación utilizado es constructivamente no invariante frente a rotaciones, y esta característica se refleja en la sensibilidad a la orientación de los segmentos que disminuye lejos de los ejes. </a:t>
+              <a:t>El </a:t>
+            </a:r>
+            <a:r>
+              <a:rPr lang="es-ES" dirty="0" smtClean="0"/>
+              <a:t>sistema de representación utilizado es constructivamente no invariante frente a rotaciones, y esta característica se refleja en la sensibilidad a la orientación de los segmentos que disminuye lejos de los ejes. </a:t>
             </a:r>
           </a:p>
         </p:txBody>
@@ -21713,16 +21864,16 @@
               <a:buChar char="-"/>
             </a:pPr>
             <a:r>
-              <a:rPr lang="es-ES" dirty="0" smtClean="0"/>
+              <a:rPr lang="es-ES" dirty="0"/>
               <a:t>Al simplificar el estímulo que se presenta (siempre usando la lógica de representación de la información del </a:t>
             </a:r>
             <a:r>
-              <a:rPr lang="es-ES" dirty="0" err="1" smtClean="0"/>
+              <a:rPr lang="es-ES" dirty="0" err="1"/>
               <a:t>vOICe</a:t>
             </a:r>
             <a:r>
-              <a:rPr lang="es-ES" dirty="0" smtClean="0"/>
-              <a:t>), los sujetos pueden reconocer patrones con muchísimo menos entrenamiento que en el caso de los estímulos complejos. Probablemente se deba a que no tienen que distinguir figura de fondo y a habilidades de compresión geométrica abstractas e independientes de la representación utilizada.</a:t>
+              <a:rPr lang="es-ES" dirty="0"/>
+              <a:t>), los sujetos pueden reconocer patrones con muchísimo menos entrenamiento que en el caso de los estímulos complejos. Probablemente se deba a que no tienen que distinguir figura de fondo. Junto a habilidades de compresión geométrica abstractas e independientes de la representación utilizada.</a:t>
             </a:r>
           </a:p>
           <a:p>
@@ -21732,7 +21883,11 @@
             </a:pPr>
             <a:r>
               <a:rPr lang="es-ES" dirty="0" smtClean="0"/>
-              <a:t>El sistema de representación utilizado es constructivamente no invariante frente a rotaciones, y esta característica se refleja en la sensibilidad a la orientación de los segmentos que disminuye lejos de los ejes. </a:t>
+              <a:t>El </a:t>
+            </a:r>
+            <a:r>
+              <a:rPr lang="es-ES" dirty="0" smtClean="0"/>
+              <a:t>sistema de representación utilizado es constructivamente no invariante frente a rotaciones, y esta característica se refleja en la sensibilidad a la orientación de los segmentos que disminuye lejos de los ejes. </a:t>
             </a:r>
           </a:p>
           <a:p>
@@ -21921,16 +22076,16 @@
               <a:buChar char="-"/>
             </a:pPr>
             <a:r>
-              <a:rPr lang="es-ES" dirty="0" smtClean="0"/>
+              <a:rPr lang="es-ES" dirty="0"/>
               <a:t>Al simplificar el estímulo que se presenta (siempre usando la lógica de representación de la información del </a:t>
             </a:r>
             <a:r>
-              <a:rPr lang="es-ES" dirty="0" err="1" smtClean="0"/>
+              <a:rPr lang="es-ES" dirty="0" err="1"/>
               <a:t>vOICe</a:t>
             </a:r>
             <a:r>
-              <a:rPr lang="es-ES" dirty="0" smtClean="0"/>
-              <a:t>), los sujetos pueden reconocer patrones con muchísimo menos entrenamiento que en el caso de los estímulos complejos. Probablemente se deba a que no tienen que distinguir figura de fondo y a habilidades de compresión geométrica abstractas e independientes de la representación utilizada.</a:t>
+              <a:rPr lang="es-ES" dirty="0"/>
+              <a:t>), los sujetos pueden reconocer patrones con muchísimo menos entrenamiento que en el caso de los estímulos complejos. Probablemente se deba a que no tienen que distinguir figura de fondo. Junto a habilidades de compresión geométrica abstractas e independientes de la representación utilizada.</a:t>
             </a:r>
           </a:p>
           <a:p>
@@ -21940,7 +22095,11 @@
             </a:pPr>
             <a:r>
               <a:rPr lang="es-ES" dirty="0" smtClean="0"/>
-              <a:t>El sistema de representación utilizado es constructivamente no invariante frente a rotaciones, y esta característica se refleja en la sensibilidad a la orientación de los segmentos que disminuye lejos de los ejes. </a:t>
+              <a:t>El </a:t>
+            </a:r>
+            <a:r>
+              <a:rPr lang="es-ES" dirty="0" smtClean="0"/>
+              <a:t>sistema de representación utilizado es constructivamente no invariante frente a rotaciones, y esta característica se refleja en la sensibilidad a la orientación de los segmentos que disminuye lejos de los ejes. </a:t>
             </a:r>
           </a:p>
           <a:p>
@@ -21968,7 +22127,39 @@
             </a:r>
             <a:r>
               <a:rPr lang="es-ES" dirty="0" smtClean="0"/>
-              <a:t>. Este efecto es mas marcado en el caso de paralelismo que en el de ángulos, probablemente a que sea una tarea inicialmente mas difícil de comprender. </a:t>
+              <a:t>. Este efecto es </a:t>
+            </a:r>
+            <a:r>
+              <a:rPr lang="es-ES" dirty="0" smtClean="0"/>
+              <a:t>más </a:t>
+            </a:r>
+            <a:r>
+              <a:rPr lang="es-ES" dirty="0" smtClean="0"/>
+              <a:t>marcado en el caso de paralelismo que en el de </a:t>
+            </a:r>
+            <a:r>
+              <a:rPr lang="es-ES" dirty="0" smtClean="0"/>
+              <a:t>ángulos. Probablemente se deba a </a:t>
+            </a:r>
+            <a:r>
+              <a:rPr lang="es-ES" dirty="0" smtClean="0"/>
+              <a:t>que </a:t>
+            </a:r>
+            <a:r>
+              <a:rPr lang="es-ES" dirty="0" smtClean="0"/>
+              <a:t>es </a:t>
+            </a:r>
+            <a:r>
+              <a:rPr lang="es-ES" dirty="0" smtClean="0"/>
+              <a:t>una tarea inicialmente </a:t>
+            </a:r>
+            <a:r>
+              <a:rPr lang="es-ES" dirty="0" smtClean="0"/>
+              <a:t>más </a:t>
+            </a:r>
+            <a:r>
+              <a:rPr lang="es-ES" dirty="0" smtClean="0"/>
+              <a:t>difícil de comprender. </a:t>
             </a:r>
           </a:p>
           <a:p>
@@ -22155,7 +22346,15 @@
             </a:pPr>
             <a:r>
               <a:rPr lang="es-ES" dirty="0" smtClean="0"/>
-              <a:t>En vista de los últimos resultados, tendría sentido reconsiderar la estrategia para estudiar y caracterizar que aspectos del  entrenamiento hacer que los sujetos mejoren rápidamente sus habilidades. </a:t>
+              <a:t>En vista de los últimos resultados, tendría sentido reconsiderar la estrategia para estudiar y caracterizar que aspectos del  entrenamiento </a:t>
+            </a:r>
+            <a:r>
+              <a:rPr lang="es-ES" dirty="0" smtClean="0"/>
+              <a:t>hacen </a:t>
+            </a:r>
+            <a:r>
+              <a:rPr lang="es-ES" dirty="0" smtClean="0"/>
+              <a:t>que los sujetos mejoren rápidamente sus habilidades. </a:t>
             </a:r>
           </a:p>
         </p:txBody>
@@ -22335,7 +22534,15 @@
             </a:pPr>
             <a:r>
               <a:rPr lang="es-ES" dirty="0" smtClean="0"/>
-              <a:t>En vista de los últimos resultados, tendría sentido reconsiderar la estrategia para estudiar y caracterizar que aspectos del  entrenamiento hacer que los sujetos mejoren rápidamente sus habilidades. </a:t>
+              <a:t>En vista de los últimos resultados, tendría sentido reconsiderar la estrategia para estudiar y caracterizar que aspectos del  entrenamiento </a:t>
+            </a:r>
+            <a:r>
+              <a:rPr lang="es-ES" dirty="0" smtClean="0"/>
+              <a:t>hacen </a:t>
+            </a:r>
+            <a:r>
+              <a:rPr lang="es-ES" dirty="0" smtClean="0"/>
+              <a:t>que los sujetos mejoren rápidamente sus habilidades. </a:t>
             </a:r>
           </a:p>
           <a:p>
@@ -22345,7 +22552,23 @@
             </a:pPr>
             <a:r>
               <a:rPr lang="es-ES" dirty="0" smtClean="0"/>
-              <a:t>Suponemos que hay un proceso de comprensión cualitativo que esta relacionado con la correcta interpretación del sistema de representación de la información, que produce un cambio de mayor intensidad que el posterior entrenamiento. Seria bueno profundizar en esta hipótesis o estudiar como se da el proceso.</a:t>
+              <a:t>Suponemos que hay un proceso de comprensión cualitativo que </a:t>
+            </a:r>
+            <a:r>
+              <a:rPr lang="es-ES" dirty="0" smtClean="0"/>
+              <a:t>está </a:t>
+            </a:r>
+            <a:r>
+              <a:rPr lang="es-ES" dirty="0" smtClean="0"/>
+              <a:t>relacionado con la correcta interpretación del sistema de representación de la información, que produce un cambio de mayor intensidad que el posterior entrenamiento. </a:t>
+            </a:r>
+            <a:r>
+              <a:rPr lang="es-ES" dirty="0" smtClean="0"/>
+              <a:t>Sería </a:t>
+            </a:r>
+            <a:r>
+              <a:rPr lang="es-ES" dirty="0" smtClean="0"/>
+              <a:t>bueno profundizar en esta hipótesis o estudiar como se da el proceso.</a:t>
             </a:r>
           </a:p>
         </p:txBody>
@@ -22525,7 +22748,15 @@
             </a:pPr>
             <a:r>
               <a:rPr lang="es-ES" dirty="0" smtClean="0"/>
-              <a:t>En vista de los últimos resultados, tendría sentido reconsiderar la estrategia para estudiar y caracterizar que aspectos del  entrenamiento hacer que los sujetos mejoren rápidamente sus habilidades. </a:t>
+              <a:t>En vista de los últimos resultados, tendría sentido reconsiderar la estrategia para estudiar y caracterizar que aspectos del  entrenamiento </a:t>
+            </a:r>
+            <a:r>
+              <a:rPr lang="es-ES" dirty="0" smtClean="0"/>
+              <a:t>hacen </a:t>
+            </a:r>
+            <a:r>
+              <a:rPr lang="es-ES" dirty="0" smtClean="0"/>
+              <a:t>que los sujetos mejoren rápidamente sus habilidades. </a:t>
             </a:r>
           </a:p>
           <a:p>
@@ -22535,7 +22766,23 @@
             </a:pPr>
             <a:r>
               <a:rPr lang="es-ES" dirty="0" smtClean="0"/>
-              <a:t>Suponemos que hay un proceso de comprensión cualitativo que esta relacionado con la correcta interpretación del sistema de representación de la información, que produce un cambio de mayor intensidad que el posterior entrenamiento. Seria bueno profundizar en esta hipótesis o estudiar como se da el proceso.</a:t>
+              <a:t>Suponemos que hay un proceso de comprensión cualitativo que </a:t>
+            </a:r>
+            <a:r>
+              <a:rPr lang="es-ES" dirty="0" smtClean="0"/>
+              <a:t>está </a:t>
+            </a:r>
+            <a:r>
+              <a:rPr lang="es-ES" dirty="0" smtClean="0"/>
+              <a:t>relacionado con la correcta interpretación del sistema de representación de la información, que produce un cambio de mayor intensidad que el posterior entrenamiento. </a:t>
+            </a:r>
+            <a:r>
+              <a:rPr lang="es-ES" dirty="0" smtClean="0"/>
+              <a:t>Sería </a:t>
+            </a:r>
+            <a:r>
+              <a:rPr lang="es-ES" dirty="0" smtClean="0"/>
+              <a:t>bueno profundizar en esta hipótesis o estudiar como se da el proceso.</a:t>
             </a:r>
           </a:p>
           <a:p>
@@ -22545,7 +22792,15 @@
             </a:pPr>
             <a:r>
               <a:rPr lang="es-ES" dirty="0" smtClean="0"/>
-              <a:t>También seria interesante cuantificar la percepción de otros aspectos </a:t>
+              <a:t>También </a:t>
+            </a:r>
+            <a:r>
+              <a:rPr lang="es-ES" dirty="0" smtClean="0"/>
+              <a:t>sería </a:t>
+            </a:r>
+            <a:r>
+              <a:rPr lang="es-ES" dirty="0" smtClean="0"/>
+              <a:t>interesante cuantificar la percepción de otros aspectos </a:t>
             </a:r>
             <a:r>
               <a:rPr lang="es-ES" dirty="0"/>
@@ -22553,7 +22808,15 @@
             </a:r>
             <a:r>
               <a:rPr lang="es-ES" dirty="0" smtClean="0"/>
-              <a:t> (además de las rotaciones) que en este trabajo no fueron casi estudiados. Por ejemplo como varia la percepción en función de la localización de estímulos o si tamaño. </a:t>
+              <a:t> (además de las rotaciones) que en este trabajo no fueron casi estudiados. Por ejemplo como </a:t>
+            </a:r>
+            <a:r>
+              <a:rPr lang="es-ES" dirty="0" smtClean="0"/>
+              <a:t>varía </a:t>
+            </a:r>
+            <a:r>
+              <a:rPr lang="es-ES" dirty="0" smtClean="0"/>
+              <a:t>la percepción en función de la localización de estímulos o si tamaño. </a:t>
             </a:r>
           </a:p>
         </p:txBody>
@@ -22733,7 +22996,15 @@
             </a:pPr>
             <a:r>
               <a:rPr lang="es-ES" dirty="0" smtClean="0"/>
-              <a:t>En vista de los últimos resultados, tendría sentido reconsiderar la estrategia para estudiar y caracterizar que aspectos del  entrenamiento hacer que los sujetos mejoren rápidamente sus habilidades. </a:t>
+              <a:t>En vista de los últimos resultados, tendría sentido reconsiderar la estrategia para estudiar y caracterizar que aspectos del  entrenamiento </a:t>
+            </a:r>
+            <a:r>
+              <a:rPr lang="es-ES" dirty="0" smtClean="0"/>
+              <a:t>hacen </a:t>
+            </a:r>
+            <a:r>
+              <a:rPr lang="es-ES" dirty="0" smtClean="0"/>
+              <a:t>que los sujetos mejoren rápidamente sus habilidades. </a:t>
             </a:r>
           </a:p>
           <a:p>
@@ -22743,7 +23014,23 @@
             </a:pPr>
             <a:r>
               <a:rPr lang="es-ES" dirty="0" smtClean="0"/>
-              <a:t>Suponemos que hay un proceso de comprensión cualitativo que esta relacionado con la correcta interpretación del sistema de representación de la información, que produce un cambio de mayor intensidad que el posterior entrenamiento. Seria bueno profundizar en esta hipótesis o estudiar como se da el proceso.</a:t>
+              <a:t>Suponemos que hay un proceso de comprensión cualitativo que </a:t>
+            </a:r>
+            <a:r>
+              <a:rPr lang="es-ES" dirty="0" smtClean="0"/>
+              <a:t>está </a:t>
+            </a:r>
+            <a:r>
+              <a:rPr lang="es-ES" dirty="0" smtClean="0"/>
+              <a:t>relacionado con la correcta interpretación del sistema de representación de la información, que produce un cambio de mayor intensidad que el posterior entrenamiento. </a:t>
+            </a:r>
+            <a:r>
+              <a:rPr lang="es-ES" dirty="0" smtClean="0"/>
+              <a:t>Sería </a:t>
+            </a:r>
+            <a:r>
+              <a:rPr lang="es-ES" dirty="0" smtClean="0"/>
+              <a:t>bueno profundizar en esta hipótesis o estudiar como se da el proceso.</a:t>
             </a:r>
           </a:p>
           <a:p>
@@ -22753,7 +23040,15 @@
             </a:pPr>
             <a:r>
               <a:rPr lang="es-ES" dirty="0" smtClean="0"/>
-              <a:t>También seria interesante cuantificar la percepción de otros aspectos </a:t>
+              <a:t>También </a:t>
+            </a:r>
+            <a:r>
+              <a:rPr lang="es-ES" dirty="0" smtClean="0"/>
+              <a:t>sería </a:t>
+            </a:r>
+            <a:r>
+              <a:rPr lang="es-ES" dirty="0" smtClean="0"/>
+              <a:t>interesante cuantificar la percepción de otros aspectos </a:t>
             </a:r>
             <a:r>
               <a:rPr lang="es-ES" dirty="0"/>
@@ -22761,7 +23056,15 @@
             </a:r>
             <a:r>
               <a:rPr lang="es-ES" dirty="0" smtClean="0"/>
-              <a:t> (además de las rotaciones) que en este trabajo no fueron casi estudiados. Por ejemplo como varia la percepción en función de la localización de estímulos o si tamaño. </a:t>
+              <a:t> (además de las rotaciones) que en este trabajo no fueron casi estudiados. Por ejemplo como </a:t>
+            </a:r>
+            <a:r>
+              <a:rPr lang="es-ES" dirty="0" smtClean="0"/>
+              <a:t>varía </a:t>
+            </a:r>
+            <a:r>
+              <a:rPr lang="es-ES" dirty="0" smtClean="0"/>
+              <a:t>la percepción en función de la localización de estímulos o si tamaño. </a:t>
             </a:r>
           </a:p>
           <a:p>
@@ -22771,7 +23074,15 @@
             </a:pPr>
             <a:r>
               <a:rPr lang="es-ES" dirty="0" smtClean="0"/>
-              <a:t>Las herramientas desarrolladas durante este trabajo (de las que casi no hablamos en esta presentación) permiten realizar experimentos a distancia, a través de celulares o paginas de internet. Con estas herramientas se podría pensar experimentos sencillos y cortos, pero que se realicen de manera masiva, para explorar aspectos hasta ahora no trabajados.</a:t>
+              <a:t>Las herramientas desarrolladas durante este trabajo (de las que casi no hablamos en esta presentación) permiten realizar experimentos a distancia, a través de celulares o </a:t>
+            </a:r>
+            <a:r>
+              <a:rPr lang="es-ES" dirty="0" smtClean="0"/>
+              <a:t>páginas </a:t>
+            </a:r>
+            <a:r>
+              <a:rPr lang="es-ES" dirty="0" smtClean="0"/>
+              <a:t>de internet. Con estas herramientas se podría pensar experimentos sencillos y cortos, pero que se realicen de manera masiva, para explorar aspectos hasta ahora no trabajados.</a:t>
             </a:r>
           </a:p>
         </p:txBody>
@@ -23613,7 +23924,15 @@
             <a:pPr algn="ctr"/>
             <a:r>
               <a:rPr lang="es-ES" sz="2000" dirty="0" smtClean="0"/>
-              <a:t>¿Hasta que punto funciona?</a:t>
+              <a:t>¿Hasta </a:t>
+            </a:r>
+            <a:r>
+              <a:rPr lang="es-ES" sz="2000" dirty="0" smtClean="0"/>
+              <a:t>qué </a:t>
+            </a:r>
+            <a:r>
+              <a:rPr lang="es-ES" sz="2000" dirty="0" smtClean="0"/>
+              <a:t>punto funciona?</a:t>
             </a:r>
             <a:endParaRPr lang="es-ES" sz="2000" dirty="0"/>
           </a:p>
@@ -24224,7 +24543,15 @@
             <a:pPr algn="ctr"/>
             <a:r>
               <a:rPr lang="es-ES" sz="2000" dirty="0" smtClean="0"/>
-              <a:t>¿Hasta que punto funciona? II</a:t>
+              <a:t>¿Hasta </a:t>
+            </a:r>
+            <a:r>
+              <a:rPr lang="es-ES" sz="2000" dirty="0" smtClean="0"/>
+              <a:t>qué </a:t>
+            </a:r>
+            <a:r>
+              <a:rPr lang="es-ES" sz="2000" dirty="0" smtClean="0"/>
+              <a:t>punto funciona? II</a:t>
             </a:r>
             <a:endParaRPr lang="es-ES" sz="2000" dirty="0"/>
           </a:p>
@@ -27701,7 +28028,15 @@
             </a:pPr>
             <a:r>
               <a:rPr lang="es-ES" dirty="0" smtClean="0"/>
-              <a:t>¿De que depende la capacidad de distinguir los estímulos? </a:t>
+              <a:t>¿De </a:t>
+            </a:r>
+            <a:r>
+              <a:rPr lang="es-ES" dirty="0" smtClean="0"/>
+              <a:t>qué </a:t>
+            </a:r>
+            <a:r>
+              <a:rPr lang="es-ES" dirty="0" smtClean="0"/>
+              <a:t>depende la capacidad de distinguir los estímulos? </a:t>
             </a:r>
           </a:p>
           <a:p>
@@ -27739,7 +28074,15 @@
             </a:pPr>
             <a:r>
               <a:rPr lang="es-ES" dirty="0" smtClean="0"/>
-              <a:t>La mejora, ¿es especifica en lo entrenado?</a:t>
+              <a:t>La mejora, ¿es </a:t>
+            </a:r>
+            <a:r>
+              <a:rPr lang="es-ES" dirty="0" smtClean="0"/>
+              <a:t>específica </a:t>
+            </a:r>
+            <a:r>
+              <a:rPr lang="es-ES" dirty="0" smtClean="0"/>
+              <a:t>en lo entrenado?</a:t>
             </a:r>
           </a:p>
           <a:p>

</xml_diff>